<commit_message>
Dodanie ikony aplikacji do prezentacji
</commit_message>
<xml_diff>
--- a/DOCX-App.pptx
+++ b/DOCX-App.pptx
@@ -117,6 +117,11 @@
       </a:defRPr>
     </a:lvl9pPr>
   </p:defaultTextStyle>
+  <p:extLst>
+    <p:ext uri="{EFAFB233-063F-42B5-8137-9DF3F51BA10A}">
+      <p15:sldGuideLst xmlns:p15="http://schemas.microsoft.com/office/powerpoint/2012/main"/>
+    </p:ext>
+  </p:extLst>
 </p:presentation>
 </file>
 
@@ -202,7 +207,7 @@
           <a:p>
             <a:fld id="{2936727B-1F66-4783-AC41-C5FA7815FBAD}" type="datetimeFigureOut">
               <a:rPr lang="pl-PL" smtClean="0"/>
-              <a:t>18.06.2024</a:t>
+              <a:t>19.06.2024</a:t>
             </a:fld>
             <a:endParaRPr lang="pl-PL"/>
           </a:p>
@@ -700,7 +705,7 @@
           <a:p>
             <a:fld id="{FA1BFF97-502B-4DF3-8FB1-E7AB7A1746EE}" type="datetimeFigureOut">
               <a:rPr lang="pl-PL" smtClean="0"/>
-              <a:t>18.06.2024</a:t>
+              <a:t>19.06.2024</a:t>
             </a:fld>
             <a:endParaRPr lang="pl-PL"/>
           </a:p>
@@ -898,7 +903,7 @@
           <a:p>
             <a:fld id="{FA1BFF97-502B-4DF3-8FB1-E7AB7A1746EE}" type="datetimeFigureOut">
               <a:rPr lang="pl-PL" smtClean="0"/>
-              <a:t>18.06.2024</a:t>
+              <a:t>19.06.2024</a:t>
             </a:fld>
             <a:endParaRPr lang="pl-PL"/>
           </a:p>
@@ -1106,7 +1111,7 @@
           <a:p>
             <a:fld id="{FA1BFF97-502B-4DF3-8FB1-E7AB7A1746EE}" type="datetimeFigureOut">
               <a:rPr lang="pl-PL" smtClean="0"/>
-              <a:t>18.06.2024</a:t>
+              <a:t>19.06.2024</a:t>
             </a:fld>
             <a:endParaRPr lang="pl-PL"/>
           </a:p>
@@ -1304,7 +1309,7 @@
           <a:p>
             <a:fld id="{FA1BFF97-502B-4DF3-8FB1-E7AB7A1746EE}" type="datetimeFigureOut">
               <a:rPr lang="pl-PL" smtClean="0"/>
-              <a:t>18.06.2024</a:t>
+              <a:t>19.06.2024</a:t>
             </a:fld>
             <a:endParaRPr lang="pl-PL"/>
           </a:p>
@@ -1579,7 +1584,7 @@
           <a:p>
             <a:fld id="{FA1BFF97-502B-4DF3-8FB1-E7AB7A1746EE}" type="datetimeFigureOut">
               <a:rPr lang="pl-PL" smtClean="0"/>
-              <a:t>18.06.2024</a:t>
+              <a:t>19.06.2024</a:t>
             </a:fld>
             <a:endParaRPr lang="pl-PL"/>
           </a:p>
@@ -1844,7 +1849,7 @@
           <a:p>
             <a:fld id="{FA1BFF97-502B-4DF3-8FB1-E7AB7A1746EE}" type="datetimeFigureOut">
               <a:rPr lang="pl-PL" smtClean="0"/>
-              <a:t>18.06.2024</a:t>
+              <a:t>19.06.2024</a:t>
             </a:fld>
             <a:endParaRPr lang="pl-PL"/>
           </a:p>
@@ -2256,7 +2261,7 @@
           <a:p>
             <a:fld id="{FA1BFF97-502B-4DF3-8FB1-E7AB7A1746EE}" type="datetimeFigureOut">
               <a:rPr lang="pl-PL" smtClean="0"/>
-              <a:t>18.06.2024</a:t>
+              <a:t>19.06.2024</a:t>
             </a:fld>
             <a:endParaRPr lang="pl-PL"/>
           </a:p>
@@ -2397,7 +2402,7 @@
           <a:p>
             <a:fld id="{FA1BFF97-502B-4DF3-8FB1-E7AB7A1746EE}" type="datetimeFigureOut">
               <a:rPr lang="pl-PL" smtClean="0"/>
-              <a:t>18.06.2024</a:t>
+              <a:t>19.06.2024</a:t>
             </a:fld>
             <a:endParaRPr lang="pl-PL"/>
           </a:p>
@@ -2510,7 +2515,7 @@
           <a:p>
             <a:fld id="{FA1BFF97-502B-4DF3-8FB1-E7AB7A1746EE}" type="datetimeFigureOut">
               <a:rPr lang="pl-PL" smtClean="0"/>
-              <a:t>18.06.2024</a:t>
+              <a:t>19.06.2024</a:t>
             </a:fld>
             <a:endParaRPr lang="pl-PL"/>
           </a:p>
@@ -2821,7 +2826,7 @@
           <a:p>
             <a:fld id="{FA1BFF97-502B-4DF3-8FB1-E7AB7A1746EE}" type="datetimeFigureOut">
               <a:rPr lang="pl-PL" smtClean="0"/>
-              <a:t>18.06.2024</a:t>
+              <a:t>19.06.2024</a:t>
             </a:fld>
             <a:endParaRPr lang="pl-PL"/>
           </a:p>
@@ -3109,7 +3114,7 @@
           <a:p>
             <a:fld id="{FA1BFF97-502B-4DF3-8FB1-E7AB7A1746EE}" type="datetimeFigureOut">
               <a:rPr lang="pl-PL" smtClean="0"/>
-              <a:t>18.06.2024</a:t>
+              <a:t>19.06.2024</a:t>
             </a:fld>
             <a:endParaRPr lang="pl-PL"/>
           </a:p>
@@ -3350,7 +3355,7 @@
           <a:p>
             <a:fld id="{FA1BFF97-502B-4DF3-8FB1-E7AB7A1746EE}" type="datetimeFigureOut">
               <a:rPr lang="pl-PL" smtClean="0"/>
-              <a:t>18.06.2024</a:t>
+              <a:t>19.06.2024</a:t>
             </a:fld>
             <a:endParaRPr lang="pl-PL"/>
           </a:p>
@@ -3783,7 +3788,12 @@
             <p:ph type="ctrTitle"/>
           </p:nvPr>
         </p:nvSpPr>
-        <p:spPr/>
+        <p:spPr>
+          <a:xfrm>
+            <a:off x="1524000" y="1122363"/>
+            <a:ext cx="4572000" cy="2387600"/>
+          </a:xfrm>
+        </p:spPr>
         <p:txBody>
           <a:bodyPr/>
           <a:lstStyle/>
@@ -3812,7 +3822,12 @@
             <p:ph type="subTitle" idx="1"/>
           </p:nvPr>
         </p:nvSpPr>
-        <p:spPr/>
+        <p:spPr>
+          <a:xfrm>
+            <a:off x="1524000" y="3602038"/>
+            <a:ext cx="4572000" cy="1655762"/>
+          </a:xfrm>
+        </p:spPr>
         <p:txBody>
           <a:bodyPr/>
           <a:lstStyle/>
@@ -3825,6 +3840,42 @@
           </a:p>
         </p:txBody>
       </p:sp>
+      <p:pic>
+        <p:nvPicPr>
+          <p:cNvPr id="8" name="Obraz 7">
+            <a:extLst>
+              <a:ext uri="{FF2B5EF4-FFF2-40B4-BE49-F238E27FC236}">
+                <a16:creationId xmlns:a16="http://schemas.microsoft.com/office/drawing/2014/main" id="{7008E197-C156-A306-D205-0CF07CAB8795}"/>
+              </a:ext>
+            </a:extLst>
+          </p:cNvPr>
+          <p:cNvPicPr>
+            <a:picLocks noChangeAspect="1"/>
+          </p:cNvPicPr>
+          <p:nvPr/>
+        </p:nvPicPr>
+        <p:blipFill>
+          <a:blip r:embed="rId2">
+            <a:extLst>
+              <a:ext uri="{28A0092B-C50C-407E-A947-70E740481C1C}">
+                <a14:useLocalDpi xmlns:a14="http://schemas.microsoft.com/office/drawing/2010/main" val="0"/>
+              </a:ext>
+            </a:extLst>
+          </a:blip>
+          <a:stretch>
+            <a:fillRect/>
+          </a:stretch>
+        </p:blipFill>
+        <p:spPr>
+          <a:xfrm>
+            <a:off x="7804620" y="1911350"/>
+            <a:ext cx="2863379" cy="3035300"/>
+          </a:xfrm>
+          <a:prstGeom prst="rect">
+            <a:avLst/>
+          </a:prstGeom>
+        </p:spPr>
+      </p:pic>
     </p:spTree>
     <p:extLst>
       <p:ext uri="{BB962C8B-B14F-4D97-AF65-F5344CB8AC3E}">

</xml_diff>